<commit_message>
code examples to backup presentation slides
</commit_message>
<xml_diff>
--- a/presentation.pptx
+++ b/presentation.pptx
@@ -4,6 +4,12 @@
   <p:sldMasterIdLst>
     <p:sldMasterId id="2147483900" r:id="rId1"/>
   </p:sldMasterIdLst>
+  <p:notesMasterIdLst>
+    <p:notesMasterId r:id="rId15"/>
+  </p:notesMasterIdLst>
+  <p:handoutMasterIdLst>
+    <p:handoutMasterId r:id="rId16"/>
+  </p:handoutMasterIdLst>
   <p:sldIdLst>
     <p:sldId id="256" r:id="rId2"/>
     <p:sldId id="257" r:id="rId3"/>
@@ -119,6 +125,613 @@
 </p:presentation>
 </file>
 
+<file path=ppt/handoutMasters/handoutMaster1.xml><?xml version="1.0" encoding="utf-8"?>
+<p:handoutMaster xmlns:a="http://schemas.openxmlformats.org/drawingml/2006/main" xmlns:r="http://schemas.openxmlformats.org/officeDocument/2006/relationships" xmlns:p="http://schemas.openxmlformats.org/presentationml/2006/main">
+  <p:cSld>
+    <p:bg>
+      <p:bgRef idx="1001">
+        <a:schemeClr val="bg1"/>
+      </p:bgRef>
+    </p:bg>
+    <p:spTree>
+      <p:nvGrpSpPr>
+        <p:cNvPr id="1" name=""/>
+        <p:cNvGrpSpPr/>
+        <p:nvPr/>
+      </p:nvGrpSpPr>
+      <p:grpSpPr>
+        <a:xfrm>
+          <a:off x="0" y="0"/>
+          <a:ext cx="0" cy="0"/>
+          <a:chOff x="0" y="0"/>
+          <a:chExt cx="0" cy="0"/>
+        </a:xfrm>
+      </p:grpSpPr>
+      <p:sp>
+        <p:nvSpPr>
+          <p:cNvPr id="2" name="Tijdelijke aanduiding voor koptekst 1">
+            <a:extLst>
+              <a:ext uri="{FF2B5EF4-FFF2-40B4-BE49-F238E27FC236}">
+                <a16:creationId xmlns:a16="http://schemas.microsoft.com/office/drawing/2014/main" id="{E3406AE5-1948-8665-DECD-D1149CBAE3AE}"/>
+              </a:ext>
+            </a:extLst>
+          </p:cNvPr>
+          <p:cNvSpPr>
+            <a:spLocks noGrp="1"/>
+          </p:cNvSpPr>
+          <p:nvPr>
+            <p:ph type="hdr" sz="quarter"/>
+          </p:nvPr>
+        </p:nvSpPr>
+        <p:spPr>
+          <a:xfrm>
+            <a:off x="0" y="0"/>
+            <a:ext cx="2971800" cy="458788"/>
+          </a:xfrm>
+          <a:prstGeom prst="rect">
+            <a:avLst/>
+          </a:prstGeom>
+        </p:spPr>
+        <p:txBody>
+          <a:bodyPr vert="horz" lIns="91440" tIns="45720" rIns="91440" bIns="45720" rtlCol="0"/>
+          <a:lstStyle>
+            <a:lvl1pPr algn="l">
+              <a:defRPr sz="1200"/>
+            </a:lvl1pPr>
+          </a:lstStyle>
+          <a:p>
+            <a:endParaRPr lang="nl-NL"/>
+          </a:p>
+        </p:txBody>
+      </p:sp>
+      <p:sp>
+        <p:nvSpPr>
+          <p:cNvPr id="3" name="Tijdelijke aanduiding voor datum 2">
+            <a:extLst>
+              <a:ext uri="{FF2B5EF4-FFF2-40B4-BE49-F238E27FC236}">
+                <a16:creationId xmlns:a16="http://schemas.microsoft.com/office/drawing/2014/main" id="{C18056D4-7201-74F4-D4B7-7C1DAD328D32}"/>
+              </a:ext>
+            </a:extLst>
+          </p:cNvPr>
+          <p:cNvSpPr>
+            <a:spLocks noGrp="1"/>
+          </p:cNvSpPr>
+          <p:nvPr>
+            <p:ph type="dt" sz="quarter" idx="1"/>
+          </p:nvPr>
+        </p:nvSpPr>
+        <p:spPr>
+          <a:xfrm>
+            <a:off x="3884613" y="0"/>
+            <a:ext cx="2971800" cy="458788"/>
+          </a:xfrm>
+          <a:prstGeom prst="rect">
+            <a:avLst/>
+          </a:prstGeom>
+        </p:spPr>
+        <p:txBody>
+          <a:bodyPr vert="horz" lIns="91440" tIns="45720" rIns="91440" bIns="45720" rtlCol="0"/>
+          <a:lstStyle>
+            <a:lvl1pPr algn="r">
+              <a:defRPr sz="1200"/>
+            </a:lvl1pPr>
+          </a:lstStyle>
+          <a:p>
+            <a:fld id="{F6AD9FD6-6B77-4E11-95A5-3BFBA8910837}" type="datetimeFigureOut">
+              <a:rPr lang="nl-NL" smtClean="0"/>
+              <a:t>17-11-2025</a:t>
+            </a:fld>
+            <a:endParaRPr lang="nl-NL"/>
+          </a:p>
+        </p:txBody>
+      </p:sp>
+      <p:sp>
+        <p:nvSpPr>
+          <p:cNvPr id="4" name="Tijdelijke aanduiding voor voettekst 3">
+            <a:extLst>
+              <a:ext uri="{FF2B5EF4-FFF2-40B4-BE49-F238E27FC236}">
+                <a16:creationId xmlns:a16="http://schemas.microsoft.com/office/drawing/2014/main" id="{D0B53BF7-EDA6-4D45-0309-75854BF63AD5}"/>
+              </a:ext>
+            </a:extLst>
+          </p:cNvPr>
+          <p:cNvSpPr>
+            <a:spLocks noGrp="1"/>
+          </p:cNvSpPr>
+          <p:nvPr>
+            <p:ph type="ftr" sz="quarter" idx="2"/>
+          </p:nvPr>
+        </p:nvSpPr>
+        <p:spPr>
+          <a:xfrm>
+            <a:off x="0" y="8685213"/>
+            <a:ext cx="2971800" cy="458787"/>
+          </a:xfrm>
+          <a:prstGeom prst="rect">
+            <a:avLst/>
+          </a:prstGeom>
+        </p:spPr>
+        <p:txBody>
+          <a:bodyPr vert="horz" lIns="91440" tIns="45720" rIns="91440" bIns="45720" rtlCol="0" anchor="b"/>
+          <a:lstStyle>
+            <a:lvl1pPr algn="l">
+              <a:defRPr sz="1200"/>
+            </a:lvl1pPr>
+          </a:lstStyle>
+          <a:p>
+            <a:r>
+              <a:rPr lang="nl-NL"/>
+              <a:t>References:</a:t>
+            </a:r>
+          </a:p>
+        </p:txBody>
+      </p:sp>
+      <p:sp>
+        <p:nvSpPr>
+          <p:cNvPr id="5" name="Tijdelijke aanduiding voor dianummer 4">
+            <a:extLst>
+              <a:ext uri="{FF2B5EF4-FFF2-40B4-BE49-F238E27FC236}">
+                <a16:creationId xmlns:a16="http://schemas.microsoft.com/office/drawing/2014/main" id="{A2F1D21D-34A8-E508-6880-BF7966460D00}"/>
+              </a:ext>
+            </a:extLst>
+          </p:cNvPr>
+          <p:cNvSpPr>
+            <a:spLocks noGrp="1"/>
+          </p:cNvSpPr>
+          <p:nvPr>
+            <p:ph type="sldNum" sz="quarter" idx="3"/>
+          </p:nvPr>
+        </p:nvSpPr>
+        <p:spPr>
+          <a:xfrm>
+            <a:off x="3884613" y="8685213"/>
+            <a:ext cx="2971800" cy="458787"/>
+          </a:xfrm>
+          <a:prstGeom prst="rect">
+            <a:avLst/>
+          </a:prstGeom>
+        </p:spPr>
+        <p:txBody>
+          <a:bodyPr vert="horz" lIns="91440" tIns="45720" rIns="91440" bIns="45720" rtlCol="0" anchor="b"/>
+          <a:lstStyle>
+            <a:lvl1pPr algn="r">
+              <a:defRPr sz="1200"/>
+            </a:lvl1pPr>
+          </a:lstStyle>
+          <a:p>
+            <a:fld id="{91D83C97-5DDF-4C88-8723-784B0283A42D}" type="slidenum">
+              <a:rPr lang="nl-NL" smtClean="0"/>
+              <a:t>‹nr.›</a:t>
+            </a:fld>
+            <a:endParaRPr lang="nl-NL"/>
+          </a:p>
+        </p:txBody>
+      </p:sp>
+    </p:spTree>
+    <p:extLst>
+      <p:ext uri="{BB962C8B-B14F-4D97-AF65-F5344CB8AC3E}">
+        <p14:creationId xmlns:p14="http://schemas.microsoft.com/office/powerpoint/2010/main" val="588260329"/>
+      </p:ext>
+    </p:extLst>
+  </p:cSld>
+  <p:clrMap bg1="lt1" tx1="dk1" bg2="lt2" tx2="dk2" accent1="accent1" accent2="accent2" accent3="accent3" accent4="accent4" accent5="accent5" accent6="accent6" hlink="hlink" folHlink="folHlink"/>
+  <p:hf sldNum="0" hdr="0" ftr="0" dt="0"/>
+</p:handoutMaster>
+</file>
+
+<file path=ppt/notesMasters/notesMaster1.xml><?xml version="1.0" encoding="utf-8"?>
+<p:notesMaster xmlns:a="http://schemas.openxmlformats.org/drawingml/2006/main" xmlns:r="http://schemas.openxmlformats.org/officeDocument/2006/relationships" xmlns:p="http://schemas.openxmlformats.org/presentationml/2006/main">
+  <p:cSld>
+    <p:bg>
+      <p:bgRef idx="1001">
+        <a:schemeClr val="bg1"/>
+      </p:bgRef>
+    </p:bg>
+    <p:spTree>
+      <p:nvGrpSpPr>
+        <p:cNvPr id="1" name=""/>
+        <p:cNvGrpSpPr/>
+        <p:nvPr/>
+      </p:nvGrpSpPr>
+      <p:grpSpPr>
+        <a:xfrm>
+          <a:off x="0" y="0"/>
+          <a:ext cx="0" cy="0"/>
+          <a:chOff x="0" y="0"/>
+          <a:chExt cx="0" cy="0"/>
+        </a:xfrm>
+      </p:grpSpPr>
+      <p:sp>
+        <p:nvSpPr>
+          <p:cNvPr id="2" name="Tijdelijke aanduiding voor koptekst 1"/>
+          <p:cNvSpPr>
+            <a:spLocks noGrp="1"/>
+          </p:cNvSpPr>
+          <p:nvPr>
+            <p:ph type="hdr" sz="quarter"/>
+          </p:nvPr>
+        </p:nvSpPr>
+        <p:spPr>
+          <a:xfrm>
+            <a:off x="0" y="0"/>
+            <a:ext cx="2971800" cy="458788"/>
+          </a:xfrm>
+          <a:prstGeom prst="rect">
+            <a:avLst/>
+          </a:prstGeom>
+        </p:spPr>
+        <p:txBody>
+          <a:bodyPr vert="horz" lIns="91440" tIns="45720" rIns="91440" bIns="45720" rtlCol="0"/>
+          <a:lstStyle>
+            <a:lvl1pPr algn="l">
+              <a:defRPr sz="1200"/>
+            </a:lvl1pPr>
+          </a:lstStyle>
+          <a:p>
+            <a:endParaRPr lang="nl-NL"/>
+          </a:p>
+        </p:txBody>
+      </p:sp>
+      <p:sp>
+        <p:nvSpPr>
+          <p:cNvPr id="3" name="Tijdelijke aanduiding voor datum 2"/>
+          <p:cNvSpPr>
+            <a:spLocks noGrp="1"/>
+          </p:cNvSpPr>
+          <p:nvPr>
+            <p:ph type="dt" idx="1"/>
+          </p:nvPr>
+        </p:nvSpPr>
+        <p:spPr>
+          <a:xfrm>
+            <a:off x="3884613" y="0"/>
+            <a:ext cx="2971800" cy="458788"/>
+          </a:xfrm>
+          <a:prstGeom prst="rect">
+            <a:avLst/>
+          </a:prstGeom>
+        </p:spPr>
+        <p:txBody>
+          <a:bodyPr vert="horz" lIns="91440" tIns="45720" rIns="91440" bIns="45720" rtlCol="0"/>
+          <a:lstStyle>
+            <a:lvl1pPr algn="r">
+              <a:defRPr sz="1200"/>
+            </a:lvl1pPr>
+          </a:lstStyle>
+          <a:p>
+            <a:fld id="{3313665A-EF05-4747-8682-4039D3E32D95}" type="datetimeFigureOut">
+              <a:rPr lang="nl-NL" smtClean="0"/>
+              <a:t>17-11-2025</a:t>
+            </a:fld>
+            <a:endParaRPr lang="nl-NL"/>
+          </a:p>
+        </p:txBody>
+      </p:sp>
+      <p:sp>
+        <p:nvSpPr>
+          <p:cNvPr id="4" name="Tijdelijke aanduiding voor dia-afbeelding 3"/>
+          <p:cNvSpPr>
+            <a:spLocks noGrp="1" noRot="1" noChangeAspect="1"/>
+          </p:cNvSpPr>
+          <p:nvPr>
+            <p:ph type="sldImg" idx="2"/>
+          </p:nvPr>
+        </p:nvSpPr>
+        <p:spPr>
+          <a:xfrm>
+            <a:off x="685800" y="1143000"/>
+            <a:ext cx="5486400" cy="3086100"/>
+          </a:xfrm>
+          <a:prstGeom prst="rect">
+            <a:avLst/>
+          </a:prstGeom>
+          <a:noFill/>
+          <a:ln w="12700">
+            <a:solidFill>
+              <a:prstClr val="black"/>
+            </a:solidFill>
+          </a:ln>
+        </p:spPr>
+        <p:txBody>
+          <a:bodyPr vert="horz" lIns="91440" tIns="45720" rIns="91440" bIns="45720" rtlCol="0" anchor="ctr"/>
+          <a:lstStyle/>
+          <a:p>
+            <a:endParaRPr lang="nl-NL"/>
+          </a:p>
+        </p:txBody>
+      </p:sp>
+      <p:sp>
+        <p:nvSpPr>
+          <p:cNvPr id="5" name="Tijdelijke aanduiding voor notities 4"/>
+          <p:cNvSpPr>
+            <a:spLocks noGrp="1"/>
+          </p:cNvSpPr>
+          <p:nvPr>
+            <p:ph type="body" sz="quarter" idx="3"/>
+          </p:nvPr>
+        </p:nvSpPr>
+        <p:spPr>
+          <a:xfrm>
+            <a:off x="685800" y="4400550"/>
+            <a:ext cx="5486400" cy="3600450"/>
+          </a:xfrm>
+          <a:prstGeom prst="rect">
+            <a:avLst/>
+          </a:prstGeom>
+        </p:spPr>
+        <p:txBody>
+          <a:bodyPr vert="horz" lIns="91440" tIns="45720" rIns="91440" bIns="45720" rtlCol="0"/>
+          <a:lstStyle/>
+          <a:p>
+            <a:pPr lvl="0"/>
+            <a:r>
+              <a:rPr lang="nl-NL"/>
+              <a:t>Klikken om de tekststijl van het model te bewerken</a:t>
+            </a:r>
+          </a:p>
+          <a:p>
+            <a:pPr lvl="1"/>
+            <a:r>
+              <a:rPr lang="nl-NL"/>
+              <a:t>Tweede niveau</a:t>
+            </a:r>
+          </a:p>
+          <a:p>
+            <a:pPr lvl="2"/>
+            <a:r>
+              <a:rPr lang="nl-NL"/>
+              <a:t>Derde niveau</a:t>
+            </a:r>
+          </a:p>
+          <a:p>
+            <a:pPr lvl="3"/>
+            <a:r>
+              <a:rPr lang="nl-NL"/>
+              <a:t>Vierde niveau</a:t>
+            </a:r>
+          </a:p>
+          <a:p>
+            <a:pPr lvl="4"/>
+            <a:r>
+              <a:rPr lang="nl-NL"/>
+              <a:t>Vijfde niveau</a:t>
+            </a:r>
+          </a:p>
+        </p:txBody>
+      </p:sp>
+      <p:sp>
+        <p:nvSpPr>
+          <p:cNvPr id="6" name="Tijdelijke aanduiding voor voettekst 5"/>
+          <p:cNvSpPr>
+            <a:spLocks noGrp="1"/>
+          </p:cNvSpPr>
+          <p:nvPr>
+            <p:ph type="ftr" sz="quarter" idx="4"/>
+          </p:nvPr>
+        </p:nvSpPr>
+        <p:spPr>
+          <a:xfrm>
+            <a:off x="0" y="8685213"/>
+            <a:ext cx="2971800" cy="458787"/>
+          </a:xfrm>
+          <a:prstGeom prst="rect">
+            <a:avLst/>
+          </a:prstGeom>
+        </p:spPr>
+        <p:txBody>
+          <a:bodyPr vert="horz" lIns="91440" tIns="45720" rIns="91440" bIns="45720" rtlCol="0" anchor="b"/>
+          <a:lstStyle>
+            <a:lvl1pPr algn="l">
+              <a:defRPr sz="1200"/>
+            </a:lvl1pPr>
+          </a:lstStyle>
+          <a:p>
+            <a:r>
+              <a:rPr lang="nl-NL"/>
+              <a:t>References:</a:t>
+            </a:r>
+          </a:p>
+        </p:txBody>
+      </p:sp>
+      <p:sp>
+        <p:nvSpPr>
+          <p:cNvPr id="7" name="Tijdelijke aanduiding voor dianummer 6"/>
+          <p:cNvSpPr>
+            <a:spLocks noGrp="1"/>
+          </p:cNvSpPr>
+          <p:nvPr>
+            <p:ph type="sldNum" sz="quarter" idx="5"/>
+          </p:nvPr>
+        </p:nvSpPr>
+        <p:spPr>
+          <a:xfrm>
+            <a:off x="3884613" y="8685213"/>
+            <a:ext cx="2971800" cy="458787"/>
+          </a:xfrm>
+          <a:prstGeom prst="rect">
+            <a:avLst/>
+          </a:prstGeom>
+        </p:spPr>
+        <p:txBody>
+          <a:bodyPr vert="horz" lIns="91440" tIns="45720" rIns="91440" bIns="45720" rtlCol="0" anchor="b"/>
+          <a:lstStyle>
+            <a:lvl1pPr algn="r">
+              <a:defRPr sz="1200"/>
+            </a:lvl1pPr>
+          </a:lstStyle>
+          <a:p>
+            <a:fld id="{9B7959A0-ED03-485E-AE57-35E077B7F201}" type="slidenum">
+              <a:rPr lang="nl-NL" smtClean="0"/>
+              <a:t>‹nr.›</a:t>
+            </a:fld>
+            <a:endParaRPr lang="nl-NL"/>
+          </a:p>
+        </p:txBody>
+      </p:sp>
+    </p:spTree>
+    <p:extLst>
+      <p:ext uri="{BB962C8B-B14F-4D97-AF65-F5344CB8AC3E}">
+        <p14:creationId xmlns:p14="http://schemas.microsoft.com/office/powerpoint/2010/main" val="3406203362"/>
+      </p:ext>
+    </p:extLst>
+  </p:cSld>
+  <p:clrMap bg1="lt1" tx1="dk1" bg2="lt2" tx2="dk2" accent1="accent1" accent2="accent2" accent3="accent3" accent4="accent4" accent5="accent5" accent6="accent6" hlink="hlink" folHlink="folHlink"/>
+  <p:hf sldNum="0" hdr="0" ftr="0" dt="0"/>
+  <p:notesStyle>
+    <a:lvl1pPr marL="0" algn="l" defTabSz="914400" rtl="0" eaLnBrk="1" latinLnBrk="0" hangingPunct="1">
+      <a:defRPr sz="1200" kern="1200">
+        <a:solidFill>
+          <a:schemeClr val="tx1"/>
+        </a:solidFill>
+        <a:latin typeface="+mn-lt"/>
+        <a:ea typeface="+mn-ea"/>
+        <a:cs typeface="+mn-cs"/>
+      </a:defRPr>
+    </a:lvl1pPr>
+    <a:lvl2pPr marL="457200" algn="l" defTabSz="914400" rtl="0" eaLnBrk="1" latinLnBrk="0" hangingPunct="1">
+      <a:defRPr sz="1200" kern="1200">
+        <a:solidFill>
+          <a:schemeClr val="tx1"/>
+        </a:solidFill>
+        <a:latin typeface="+mn-lt"/>
+        <a:ea typeface="+mn-ea"/>
+        <a:cs typeface="+mn-cs"/>
+      </a:defRPr>
+    </a:lvl2pPr>
+    <a:lvl3pPr marL="914400" algn="l" defTabSz="914400" rtl="0" eaLnBrk="1" latinLnBrk="0" hangingPunct="1">
+      <a:defRPr sz="1200" kern="1200">
+        <a:solidFill>
+          <a:schemeClr val="tx1"/>
+        </a:solidFill>
+        <a:latin typeface="+mn-lt"/>
+        <a:ea typeface="+mn-ea"/>
+        <a:cs typeface="+mn-cs"/>
+      </a:defRPr>
+    </a:lvl3pPr>
+    <a:lvl4pPr marL="1371600" algn="l" defTabSz="914400" rtl="0" eaLnBrk="1" latinLnBrk="0" hangingPunct="1">
+      <a:defRPr sz="1200" kern="1200">
+        <a:solidFill>
+          <a:schemeClr val="tx1"/>
+        </a:solidFill>
+        <a:latin typeface="+mn-lt"/>
+        <a:ea typeface="+mn-ea"/>
+        <a:cs typeface="+mn-cs"/>
+      </a:defRPr>
+    </a:lvl4pPr>
+    <a:lvl5pPr marL="1828800" algn="l" defTabSz="914400" rtl="0" eaLnBrk="1" latinLnBrk="0" hangingPunct="1">
+      <a:defRPr sz="1200" kern="1200">
+        <a:solidFill>
+          <a:schemeClr val="tx1"/>
+        </a:solidFill>
+        <a:latin typeface="+mn-lt"/>
+        <a:ea typeface="+mn-ea"/>
+        <a:cs typeface="+mn-cs"/>
+      </a:defRPr>
+    </a:lvl5pPr>
+    <a:lvl6pPr marL="2286000" algn="l" defTabSz="914400" rtl="0" eaLnBrk="1" latinLnBrk="0" hangingPunct="1">
+      <a:defRPr sz="1200" kern="1200">
+        <a:solidFill>
+          <a:schemeClr val="tx1"/>
+        </a:solidFill>
+        <a:latin typeface="+mn-lt"/>
+        <a:ea typeface="+mn-ea"/>
+        <a:cs typeface="+mn-cs"/>
+      </a:defRPr>
+    </a:lvl6pPr>
+    <a:lvl7pPr marL="2743200" algn="l" defTabSz="914400" rtl="0" eaLnBrk="1" latinLnBrk="0" hangingPunct="1">
+      <a:defRPr sz="1200" kern="1200">
+        <a:solidFill>
+          <a:schemeClr val="tx1"/>
+        </a:solidFill>
+        <a:latin typeface="+mn-lt"/>
+        <a:ea typeface="+mn-ea"/>
+        <a:cs typeface="+mn-cs"/>
+      </a:defRPr>
+    </a:lvl7pPr>
+    <a:lvl8pPr marL="3200400" algn="l" defTabSz="914400" rtl="0" eaLnBrk="1" latinLnBrk="0" hangingPunct="1">
+      <a:defRPr sz="1200" kern="1200">
+        <a:solidFill>
+          <a:schemeClr val="tx1"/>
+        </a:solidFill>
+        <a:latin typeface="+mn-lt"/>
+        <a:ea typeface="+mn-ea"/>
+        <a:cs typeface="+mn-cs"/>
+      </a:defRPr>
+    </a:lvl8pPr>
+    <a:lvl9pPr marL="3657600" algn="l" defTabSz="914400" rtl="0" eaLnBrk="1" latinLnBrk="0" hangingPunct="1">
+      <a:defRPr sz="1200" kern="1200">
+        <a:solidFill>
+          <a:schemeClr val="tx1"/>
+        </a:solidFill>
+        <a:latin typeface="+mn-lt"/>
+        <a:ea typeface="+mn-ea"/>
+        <a:cs typeface="+mn-cs"/>
+      </a:defRPr>
+    </a:lvl9pPr>
+  </p:notesStyle>
+</p:notesMaster>
+</file>
+
+<file path=ppt/notesSlides/notesSlide1.xml><?xml version="1.0" encoding="utf-8"?>
+<p:notes xmlns:a="http://schemas.openxmlformats.org/drawingml/2006/main" xmlns:r="http://schemas.openxmlformats.org/officeDocument/2006/relationships" xmlns:p="http://schemas.openxmlformats.org/presentationml/2006/main">
+  <p:cSld>
+    <p:spTree>
+      <p:nvGrpSpPr>
+        <p:cNvPr id="1" name=""/>
+        <p:cNvGrpSpPr/>
+        <p:nvPr/>
+      </p:nvGrpSpPr>
+      <p:grpSpPr>
+        <a:xfrm>
+          <a:off x="0" y="0"/>
+          <a:ext cx="0" cy="0"/>
+          <a:chOff x="0" y="0"/>
+          <a:chExt cx="0" cy="0"/>
+        </a:xfrm>
+      </p:grpSpPr>
+      <p:sp>
+        <p:nvSpPr>
+          <p:cNvPr id="2" name="Tijdelijke aanduiding voor dia-afbeelding 1"/>
+          <p:cNvSpPr>
+            <a:spLocks noGrp="1" noRot="1" noChangeAspect="1"/>
+          </p:cNvSpPr>
+          <p:nvPr>
+            <p:ph type="sldImg"/>
+          </p:nvPr>
+        </p:nvSpPr>
+        <p:spPr/>
+      </p:sp>
+      <p:sp>
+        <p:nvSpPr>
+          <p:cNvPr id="3" name="Tijdelijke aanduiding voor notities 2"/>
+          <p:cNvSpPr>
+            <a:spLocks noGrp="1"/>
+          </p:cNvSpPr>
+          <p:nvPr>
+            <p:ph type="body" idx="1"/>
+          </p:nvPr>
+        </p:nvSpPr>
+        <p:spPr/>
+        <p:txBody>
+          <a:bodyPr/>
+          <a:lstStyle/>
+          <a:p>
+            <a:endParaRPr lang="nl-NL" dirty="0"/>
+          </a:p>
+        </p:txBody>
+      </p:sp>
+    </p:spTree>
+    <p:extLst>
+      <p:ext uri="{BB962C8B-B14F-4D97-AF65-F5344CB8AC3E}">
+        <p14:creationId xmlns:p14="http://schemas.microsoft.com/office/powerpoint/2010/main" val="1762622006"/>
+      </p:ext>
+    </p:extLst>
+  </p:cSld>
+  <p:clrMapOvr>
+    <a:masterClrMapping/>
+  </p:clrMapOvr>
+</p:notes>
+</file>
+
 <file path=ppt/slideLayouts/slideLayout1.xml><?xml version="1.0" encoding="utf-8"?>
 <p:sldLayout xmlns:a="http://schemas.openxmlformats.org/drawingml/2006/main" xmlns:r="http://schemas.openxmlformats.org/officeDocument/2006/relationships" xmlns:p="http://schemas.openxmlformats.org/presentationml/2006/main" type="title" preserve="1">
   <p:cSld name="Title Slide">
@@ -273,9 +886,9 @@
           <a:bodyPr/>
           <a:lstStyle/>
           <a:p>
-            <a:fld id="{6444479B-705B-4489-957E-7E8A228BDFA0}" type="datetime1">
+            <a:fld id="{ED10DCF1-9AB2-4DB3-9240-BAA22F279902}" type="datetime1">
               <a:rPr lang="en-US" smtClean="0"/>
-              <a:t>11/16/2025</a:t>
+              <a:t>11/17/2025</a:t>
             </a:fld>
             <a:endParaRPr lang="en-US"/>
           </a:p>
@@ -473,9 +1086,9 @@
           <a:bodyPr/>
           <a:lstStyle/>
           <a:p>
-            <a:fld id="{C07B66AD-7C08-490A-ADA4-B47E10FB2407}" type="datetime1">
+            <a:fld id="{6EC278EF-7443-4FD8-97CF-39421BF309DB}" type="datetime1">
               <a:rPr lang="en-US" smtClean="0"/>
-              <a:t>11/16/2025</a:t>
+              <a:t>11/17/2025</a:t>
             </a:fld>
             <a:endParaRPr lang="en-US"/>
           </a:p>
@@ -732,9 +1345,9 @@
           <a:bodyPr/>
           <a:lstStyle/>
           <a:p>
-            <a:fld id="{05B95027-4255-49E7-9841-CD21BCC99996}" type="datetime1">
+            <a:fld id="{8B155FD5-0E0B-475F-BD61-F625D56CC331}" type="datetime1">
               <a:rPr lang="en-US" smtClean="0"/>
-              <a:t>11/16/2025</a:t>
+              <a:t>11/17/2025</a:t>
             </a:fld>
             <a:endParaRPr lang="en-US"/>
           </a:p>
@@ -973,9 +1586,9 @@
           <a:bodyPr/>
           <a:lstStyle/>
           <a:p>
-            <a:fld id="{9F89F774-3FA6-43B8-9241-99959C8FD463}" type="datetime1">
+            <a:fld id="{9E17163F-FBE6-4A12-BDD0-23750837041A}" type="datetime1">
               <a:rPr lang="en-US" smtClean="0"/>
-              <a:t>11/16/2025</a:t>
+              <a:t>11/17/2025</a:t>
             </a:fld>
             <a:endParaRPr lang="en-US"/>
           </a:p>
@@ -1300,9 +1913,9 @@
           <a:bodyPr/>
           <a:lstStyle/>
           <a:p>
-            <a:fld id="{F9504452-5DCC-4FE2-A5C9-8A5EF6714D65}" type="datetime1">
+            <a:fld id="{305DE35E-A218-4ED9-B667-58FEB34CC7AC}" type="datetime1">
               <a:rPr lang="en-US" smtClean="0"/>
-              <a:t>11/16/2025</a:t>
+              <a:t>11/17/2025</a:t>
             </a:fld>
             <a:endParaRPr lang="en-US"/>
           </a:p>
@@ -1610,9 +2223,9 @@
           <a:bodyPr/>
           <a:lstStyle/>
           <a:p>
-            <a:fld id="{E579ABC2-0180-4F3A-A895-A85BC724D472}" type="datetime1">
+            <a:fld id="{C695BC0D-B504-470C-8312-EB24B9AABCC8}" type="datetime1">
               <a:rPr lang="en-US" smtClean="0"/>
-              <a:t>11/16/2025</a:t>
+              <a:t>11/17/2025</a:t>
             </a:fld>
             <a:endParaRPr lang="en-US"/>
           </a:p>
@@ -2028,9 +2641,9 @@
           <a:bodyPr/>
           <a:lstStyle/>
           <a:p>
-            <a:fld id="{6AEEA9BA-4E8F-439E-BEA4-91FBA01E3F5F}" type="datetime1">
+            <a:fld id="{C3DBA360-B814-43CF-877D-6108259A603E}" type="datetime1">
               <a:rPr lang="en-US" smtClean="0"/>
-              <a:t>11/16/2025</a:t>
+              <a:t>11/17/2025</a:t>
             </a:fld>
             <a:endParaRPr lang="en-US"/>
           </a:p>
@@ -2170,9 +2783,9 @@
           <a:bodyPr/>
           <a:lstStyle/>
           <a:p>
-            <a:fld id="{BE15BF18-0007-481C-AA29-413124BC3EE7}" type="datetime1">
+            <a:fld id="{D287C72B-6AFA-4FD0-9445-B669E4C4C963}" type="datetime1">
               <a:rPr lang="en-US" smtClean="0"/>
-              <a:t>11/16/2025</a:t>
+              <a:t>11/17/2025</a:t>
             </a:fld>
             <a:endParaRPr lang="en-US"/>
           </a:p>
@@ -2332,9 +2945,9 @@
           <a:bodyPr/>
           <a:lstStyle/>
           <a:p>
-            <a:fld id="{09BE9870-3748-43AD-B547-02A075CB4A1D}" type="datetime1">
+            <a:fld id="{D62A3638-C4B1-4851-82CF-DA81195D543E}" type="datetime1">
               <a:rPr lang="en-US" smtClean="0"/>
-              <a:t>11/16/2025</a:t>
+              <a:t>11/17/2025</a:t>
             </a:fld>
             <a:endParaRPr lang="en-US"/>
           </a:p>
@@ -2649,9 +3262,9 @@
           <a:bodyPr/>
           <a:lstStyle/>
           <a:p>
-            <a:fld id="{558E7897-33C5-4F1A-9307-D068E37F3DC7}" type="datetime1">
+            <a:fld id="{733F5450-BA9A-473C-AB86-7673E67B172F}" type="datetime1">
               <a:rPr lang="en-US" smtClean="0"/>
-              <a:t>11/16/2025</a:t>
+              <a:t>11/17/2025</a:t>
             </a:fld>
             <a:endParaRPr lang="en-US"/>
           </a:p>
@@ -2944,9 +3557,9 @@
           <a:bodyPr/>
           <a:lstStyle/>
           <a:p>
-            <a:fld id="{82E171BA-CC09-47C8-A6DF-F5C5CB59CEEC}" type="datetime1">
+            <a:fld id="{3F7C197F-9899-447A-A056-2EC40E137156}" type="datetime1">
               <a:rPr lang="en-US" smtClean="0"/>
-              <a:t>11/16/2025</a:t>
+              <a:t>11/17/2025</a:t>
             </a:fld>
             <a:endParaRPr lang="en-US"/>
           </a:p>
@@ -3185,9 +3798,9 @@
             </a:lvl1pPr>
           </a:lstStyle>
           <a:p>
-            <a:fld id="{7DA38F49-B3E2-4BF0-BEC7-C30D34ABBB8D}" type="datetime1">
+            <a:fld id="{E7B4481C-DAEF-493B-8202-C72925E6C92A}" type="datetime1">
               <a:rPr lang="en-US" smtClean="0"/>
-              <a:t>11/16/2025</a:t>
+              <a:t>11/17/2025</a:t>
             </a:fld>
             <a:endParaRPr lang="en-US"/>
           </a:p>
@@ -3342,7 +3955,7 @@
     <p:sldLayoutId id="2147483892" r:id="rId10"/>
     <p:sldLayoutId id="2147483894" r:id="rId11"/>
   </p:sldLayoutIdLst>
-  <p:hf sldNum="0" hdr="0" ftr="0" dt="0"/>
+  <p:hf sldNum="0" hdr="0" dt="0"/>
   <p:txStyles>
     <p:titleStyle>
       <a:lvl1pPr algn="l" defTabSz="914400" rtl="0" eaLnBrk="1" latinLnBrk="0" hangingPunct="1">
@@ -3948,6 +4561,31 @@
           </a:fontRef>
         </p:style>
       </p:cxnSp>
+      <p:sp>
+        <p:nvSpPr>
+          <p:cNvPr id="5" name="Tijdelijke aanduiding voor voettekst 4">
+            <a:extLst>
+              <a:ext uri="{FF2B5EF4-FFF2-40B4-BE49-F238E27FC236}">
+                <a16:creationId xmlns:a16="http://schemas.microsoft.com/office/drawing/2014/main" id="{AAABB686-3A23-498F-4EF7-18A004A9A480}"/>
+              </a:ext>
+            </a:extLst>
+          </p:cNvPr>
+          <p:cNvSpPr>
+            <a:spLocks noGrp="1"/>
+          </p:cNvSpPr>
+          <p:nvPr>
+            <p:ph type="ftr" sz="quarter" idx="11"/>
+          </p:nvPr>
+        </p:nvSpPr>
+        <p:spPr/>
+        <p:txBody>
+          <a:bodyPr/>
+          <a:lstStyle/>
+          <a:p>
+            <a:endParaRPr lang="en-US" dirty="0"/>
+          </a:p>
+        </p:txBody>
+      </p:sp>
     </p:spTree>
     <p:extLst>
       <p:ext uri="{BB962C8B-B14F-4D97-AF65-F5344CB8AC3E}">
@@ -4224,14 +4862,77 @@
               <a:t> you want done, Java handles the mechanics</a:t>
             </a:r>
           </a:p>
+          <a:p>
+            <a:pPr lvl="1"/>
+            <a:endParaRPr lang="en-US" dirty="0"/>
+          </a:p>
+          <a:p>
+            <a:pPr lvl="1"/>
+            <a:endParaRPr lang="en-US" dirty="0"/>
+          </a:p>
+          <a:p>
+            <a:pPr lvl="1"/>
+            <a:endParaRPr lang="en-US" dirty="0"/>
+          </a:p>
+          <a:p>
+            <a:pPr marL="265176" lvl="1" indent="0">
+              <a:buNone/>
+            </a:pPr>
+            <a:endParaRPr lang="en-US" dirty="0"/>
+          </a:p>
+        </p:txBody>
+      </p:sp>
+      <p:sp>
+        <p:nvSpPr>
+          <p:cNvPr id="5" name="Tijdelijke aanduiding voor voettekst 4">
+            <a:extLst>
+              <a:ext uri="{FF2B5EF4-FFF2-40B4-BE49-F238E27FC236}">
+                <a16:creationId xmlns:a16="http://schemas.microsoft.com/office/drawing/2014/main" id="{E6A8E938-BDF9-E4E1-AE5B-39A5F79B9B35}"/>
+              </a:ext>
+            </a:extLst>
+          </p:cNvPr>
+          <p:cNvSpPr>
+            <a:spLocks noGrp="1"/>
+          </p:cNvSpPr>
+          <p:nvPr>
+            <p:ph type="ftr" sz="quarter" idx="11"/>
+          </p:nvPr>
+        </p:nvSpPr>
+        <p:spPr/>
+        <p:txBody>
+          <a:bodyPr/>
+          <a:lstStyle/>
+          <a:p>
+            <a:r>
+              <a:rPr lang="nl-NL" dirty="0"/>
+              <a:t>(</a:t>
+            </a:r>
+            <a:r>
+              <a:rPr lang="nl-NL" dirty="0" err="1"/>
+              <a:t>TutorialsPoint</a:t>
+            </a:r>
+            <a:r>
+              <a:rPr lang="nl-NL" dirty="0"/>
+              <a:t>, </a:t>
+            </a:r>
+            <a:r>
+              <a:rPr lang="nl-NL" dirty="0" err="1"/>
+              <a:t>n.d</a:t>
+            </a:r>
+            <a:r>
+              <a:rPr lang="nl-NL" dirty="0"/>
+              <a:t>.)</a:t>
+            </a:r>
+            <a:endParaRPr lang="en-US" dirty="0"/>
+          </a:p>
         </p:txBody>
       </p:sp>
       <p:pic>
         <p:nvPicPr>
-          <p:cNvPr id="4" name="Picture 4" descr="101010 gegevens lijnen naar oneindig">
-            <a:extLst>
-              <a:ext uri="{FF2B5EF4-FFF2-40B4-BE49-F238E27FC236}">
-                <a16:creationId xmlns:a16="http://schemas.microsoft.com/office/drawing/2014/main" id="{AA98FA74-3138-4B33-5B86-F3722DEA3454}"/>
+          <p:cNvPr id="6" name="Picture 4" descr="101010 gegevens lijnen naar oneindig">
+            <a:extLst>
+              <a:ext uri="{FF2B5EF4-FFF2-40B4-BE49-F238E27FC236}">
+                <a16:creationId xmlns:a16="http://schemas.microsoft.com/office/drawing/2014/main" id="{9C87A7BC-3C7D-F2FE-1D5C-9B355A9F23B0}"/>
               </a:ext>
             </a:extLst>
           </p:cNvPr>
@@ -4253,8 +4954,8 @@
         </p:blipFill>
         <p:spPr>
           <a:xfrm>
-            <a:off x="7345680" y="10"/>
-            <a:ext cx="4846320" cy="6857990"/>
+            <a:off x="7833360" y="0"/>
+            <a:ext cx="4358640" cy="6167878"/>
           </a:xfrm>
           <a:prstGeom prst="rect">
             <a:avLst/>
@@ -4552,16 +5253,50 @@
             </a:r>
           </a:p>
           <a:p>
+            <a:pPr marL="0" indent="0">
+              <a:buNone/>
+            </a:pPr>
             <a:endParaRPr lang="en-US" dirty="0"/>
+          </a:p>
+          <a:p>
+            <a:endParaRPr lang="en-US" dirty="0"/>
+          </a:p>
+        </p:txBody>
+      </p:sp>
+      <p:sp>
+        <p:nvSpPr>
+          <p:cNvPr id="5" name="Tijdelijke aanduiding voor voettekst 4">
+            <a:extLst>
+              <a:ext uri="{FF2B5EF4-FFF2-40B4-BE49-F238E27FC236}">
+                <a16:creationId xmlns:a16="http://schemas.microsoft.com/office/drawing/2014/main" id="{1CBB8858-08B9-C5FB-3B9F-AFB917CB1E14}"/>
+              </a:ext>
+            </a:extLst>
+          </p:cNvPr>
+          <p:cNvSpPr>
+            <a:spLocks noGrp="1"/>
+          </p:cNvSpPr>
+          <p:nvPr>
+            <p:ph type="ftr" sz="quarter" idx="11"/>
+          </p:nvPr>
+        </p:nvSpPr>
+        <p:spPr/>
+        <p:txBody>
+          <a:bodyPr/>
+          <a:lstStyle/>
+          <a:p>
+            <a:r>
+              <a:rPr lang="en-US" dirty="0"/>
+              <a:t>Own JMH benchmark methodology (2025)</a:t>
+            </a:r>
           </a:p>
         </p:txBody>
       </p:sp>
       <p:pic>
         <p:nvPicPr>
-          <p:cNvPr id="4" name="Picture 4" descr="101010 gegevens lijnen naar oneindig">
-            <a:extLst>
-              <a:ext uri="{FF2B5EF4-FFF2-40B4-BE49-F238E27FC236}">
-                <a16:creationId xmlns:a16="http://schemas.microsoft.com/office/drawing/2014/main" id="{B91DE195-F3A5-D472-DFD0-949E0E22998E}"/>
+          <p:cNvPr id="6" name="Picture 4" descr="101010 gegevens lijnen naar oneindig">
+            <a:extLst>
+              <a:ext uri="{FF2B5EF4-FFF2-40B4-BE49-F238E27FC236}">
+                <a16:creationId xmlns:a16="http://schemas.microsoft.com/office/drawing/2014/main" id="{2888B4A5-2B92-A1A0-C99B-F4D672E5E3BD}"/>
               </a:ext>
             </a:extLst>
           </p:cNvPr>
@@ -4583,8 +5318,8 @@
         </p:blipFill>
         <p:spPr>
           <a:xfrm>
-            <a:off x="7345680" y="10"/>
-            <a:ext cx="4846320" cy="6857990"/>
+            <a:off x="7833360" y="0"/>
+            <a:ext cx="4358640" cy="6167878"/>
           </a:xfrm>
           <a:prstGeom prst="rect">
             <a:avLst/>
@@ -5311,6 +6046,34 @@
           </a:graphicData>
         </a:graphic>
       </p:graphicFrame>
+      <p:sp>
+        <p:nvSpPr>
+          <p:cNvPr id="5" name="Tijdelijke aanduiding voor voettekst 4">
+            <a:extLst>
+              <a:ext uri="{FF2B5EF4-FFF2-40B4-BE49-F238E27FC236}">
+                <a16:creationId xmlns:a16="http://schemas.microsoft.com/office/drawing/2014/main" id="{838AB596-B13E-37D0-E7D1-9443E8B1FFDF}"/>
+              </a:ext>
+            </a:extLst>
+          </p:cNvPr>
+          <p:cNvSpPr>
+            <a:spLocks noGrp="1"/>
+          </p:cNvSpPr>
+          <p:nvPr>
+            <p:ph type="ftr" sz="quarter" idx="11"/>
+          </p:nvPr>
+        </p:nvSpPr>
+        <p:spPr/>
+        <p:txBody>
+          <a:bodyPr/>
+          <a:lstStyle/>
+          <a:p>
+            <a:r>
+              <a:rPr lang="en-US" dirty="0"/>
+              <a:t>Own JMH benchmark results (2025)</a:t>
+            </a:r>
+          </a:p>
+        </p:txBody>
+      </p:sp>
     </p:spTree>
     <p:extLst>
       <p:ext uri="{BB962C8B-B14F-4D97-AF65-F5344CB8AC3E}">
@@ -5574,12 +6337,37 @@
           </a:p>
         </p:txBody>
       </p:sp>
+      <p:sp>
+        <p:nvSpPr>
+          <p:cNvPr id="5" name="Tijdelijke aanduiding voor voettekst 4">
+            <a:extLst>
+              <a:ext uri="{FF2B5EF4-FFF2-40B4-BE49-F238E27FC236}">
+                <a16:creationId xmlns:a16="http://schemas.microsoft.com/office/drawing/2014/main" id="{74F359E9-CC34-B0B6-D120-9C72D50CEE90}"/>
+              </a:ext>
+            </a:extLst>
+          </p:cNvPr>
+          <p:cNvSpPr>
+            <a:spLocks noGrp="1"/>
+          </p:cNvSpPr>
+          <p:nvPr>
+            <p:ph type="ftr" sz="quarter" idx="11"/>
+          </p:nvPr>
+        </p:nvSpPr>
+        <p:spPr/>
+        <p:txBody>
+          <a:bodyPr/>
+          <a:lstStyle/>
+          <a:p>
+            <a:endParaRPr lang="en-US" dirty="0"/>
+          </a:p>
+        </p:txBody>
+      </p:sp>
       <p:pic>
         <p:nvPicPr>
-          <p:cNvPr id="4" name="Picture 4" descr="101010 gegevens lijnen naar oneindig">
-            <a:extLst>
-              <a:ext uri="{FF2B5EF4-FFF2-40B4-BE49-F238E27FC236}">
-                <a16:creationId xmlns:a16="http://schemas.microsoft.com/office/drawing/2014/main" id="{9188C5BE-57B0-37E8-2451-E366EB51B8A4}"/>
+          <p:cNvPr id="6" name="Picture 4" descr="101010 gegevens lijnen naar oneindig">
+            <a:extLst>
+              <a:ext uri="{FF2B5EF4-FFF2-40B4-BE49-F238E27FC236}">
+                <a16:creationId xmlns:a16="http://schemas.microsoft.com/office/drawing/2014/main" id="{032235A4-A376-5017-8A8E-B25A26A2A62C}"/>
               </a:ext>
             </a:extLst>
           </p:cNvPr>
@@ -5601,8 +6389,8 @@
         </p:blipFill>
         <p:spPr>
           <a:xfrm>
-            <a:off x="7345680" y="10"/>
-            <a:ext cx="4846320" cy="6857990"/>
+            <a:off x="7833360" y="0"/>
+            <a:ext cx="4358640" cy="6167878"/>
           </a:xfrm>
           <a:prstGeom prst="rect">
             <a:avLst/>
@@ -5835,19 +6623,86 @@
           </a:bodyPr>
           <a:lstStyle/>
           <a:p>
-            <a:pPr marL="0" indent="0">
-              <a:buNone/>
-            </a:pPr>
+            <a:r>
+              <a:rPr lang="nl-NL" dirty="0" err="1"/>
+              <a:t>Introduced</a:t>
+            </a:r>
+            <a:r>
+              <a:rPr lang="nl-NL" dirty="0"/>
+              <a:t> in Java 8</a:t>
+            </a:r>
+          </a:p>
+          <a:p>
+            <a:r>
+              <a:rPr lang="nl-NL" dirty="0" err="1"/>
+              <a:t>Replaces</a:t>
+            </a:r>
+            <a:r>
+              <a:rPr lang="nl-NL" dirty="0"/>
+              <a:t> loops</a:t>
+            </a:r>
+          </a:p>
+          <a:p>
+            <a:r>
+              <a:rPr lang="nl-NL" dirty="0"/>
+              <a:t>Modern </a:t>
+            </a:r>
+            <a:r>
+              <a:rPr lang="nl-NL" dirty="0" err="1"/>
+              <a:t>and</a:t>
+            </a:r>
+            <a:r>
+              <a:rPr lang="nl-NL" dirty="0"/>
+              <a:t> </a:t>
+            </a:r>
+            <a:r>
+              <a:rPr lang="nl-NL" dirty="0" err="1"/>
+              <a:t>declarative</a:t>
+            </a:r>
             <a:endParaRPr lang="nl-NL" dirty="0"/>
+          </a:p>
+          <a:p>
+            <a:endParaRPr lang="nl-NL" dirty="0"/>
+          </a:p>
+        </p:txBody>
+      </p:sp>
+      <p:sp>
+        <p:nvSpPr>
+          <p:cNvPr id="4" name="Tijdelijke aanduiding voor voettekst 3">
+            <a:extLst>
+              <a:ext uri="{FF2B5EF4-FFF2-40B4-BE49-F238E27FC236}">
+                <a16:creationId xmlns:a16="http://schemas.microsoft.com/office/drawing/2014/main" id="{20FC18DA-9F29-FA12-E739-4190E4AA2DB1}"/>
+              </a:ext>
+            </a:extLst>
+          </p:cNvPr>
+          <p:cNvSpPr>
+            <a:spLocks noGrp="1"/>
+          </p:cNvSpPr>
+          <p:nvPr>
+            <p:ph type="ftr" sz="quarter" idx="11"/>
+          </p:nvPr>
+        </p:nvSpPr>
+        <p:spPr/>
+        <p:txBody>
+          <a:bodyPr/>
+          <a:lstStyle/>
+          <a:p>
+            <a:r>
+              <a:rPr lang="nl-NL"/>
+              <a:t>Baeldung (2023); Paraschiv (2024)</a:t>
+            </a:r>
+          </a:p>
+          <a:p>
+            <a:endParaRPr lang="en-US" dirty="0"/>
           </a:p>
         </p:txBody>
       </p:sp>
       <p:pic>
         <p:nvPicPr>
-          <p:cNvPr id="5" name="Picture 4" descr="101010 gegevens lijnen naar oneindig">
-            <a:extLst>
-              <a:ext uri="{FF2B5EF4-FFF2-40B4-BE49-F238E27FC236}">
-                <a16:creationId xmlns:a16="http://schemas.microsoft.com/office/drawing/2014/main" id="{26FC6C3E-CAD1-7FAB-E8AE-F38370D5BBA9}"/>
+          <p:cNvPr id="6" name="Picture 4" descr="101010 gegevens lijnen naar oneindig">
+            <a:extLst>
+              <a:ext uri="{FF2B5EF4-FFF2-40B4-BE49-F238E27FC236}">
+                <a16:creationId xmlns:a16="http://schemas.microsoft.com/office/drawing/2014/main" id="{DF2CF691-6DC9-7A61-8372-5DFDF2B96FC0}"/>
               </a:ext>
             </a:extLst>
           </p:cNvPr>
@@ -5869,8 +6724,8 @@
         </p:blipFill>
         <p:spPr>
           <a:xfrm>
-            <a:off x="7345680" y="10"/>
-            <a:ext cx="4846320" cy="6857990"/>
+            <a:off x="7833360" y="0"/>
+            <a:ext cx="4358640" cy="6167878"/>
           </a:xfrm>
           <a:prstGeom prst="rect">
             <a:avLst/>
@@ -6226,12 +7081,37 @@
           </a:p>
         </p:txBody>
       </p:sp>
+      <p:sp>
+        <p:nvSpPr>
+          <p:cNvPr id="6" name="Tijdelijke aanduiding voor voettekst 5">
+            <a:extLst>
+              <a:ext uri="{FF2B5EF4-FFF2-40B4-BE49-F238E27FC236}">
+                <a16:creationId xmlns:a16="http://schemas.microsoft.com/office/drawing/2014/main" id="{B5592AA6-A2E5-E9C0-7780-B340DC4B8E6A}"/>
+              </a:ext>
+            </a:extLst>
+          </p:cNvPr>
+          <p:cNvSpPr>
+            <a:spLocks noGrp="1"/>
+          </p:cNvSpPr>
+          <p:nvPr>
+            <p:ph type="ftr" sz="quarter" idx="11"/>
+          </p:nvPr>
+        </p:nvSpPr>
+        <p:spPr/>
+        <p:txBody>
+          <a:bodyPr/>
+          <a:lstStyle/>
+          <a:p>
+            <a:endParaRPr lang="en-US" dirty="0"/>
+          </a:p>
+        </p:txBody>
+      </p:sp>
       <p:pic>
         <p:nvPicPr>
-          <p:cNvPr id="4" name="Picture 4" descr="101010 gegevens lijnen naar oneindig">
-            <a:extLst>
-              <a:ext uri="{FF2B5EF4-FFF2-40B4-BE49-F238E27FC236}">
-                <a16:creationId xmlns:a16="http://schemas.microsoft.com/office/drawing/2014/main" id="{86D2F8BD-232E-1A8B-F4FA-21F5AF6CC50B}"/>
+          <p:cNvPr id="7" name="Picture 4" descr="101010 gegevens lijnen naar oneindig">
+            <a:extLst>
+              <a:ext uri="{FF2B5EF4-FFF2-40B4-BE49-F238E27FC236}">
+                <a16:creationId xmlns:a16="http://schemas.microsoft.com/office/drawing/2014/main" id="{755D0A3A-3FF0-3B38-8D3D-E86BD43186FA}"/>
               </a:ext>
             </a:extLst>
           </p:cNvPr>
@@ -6253,8 +7133,8 @@
         </p:blipFill>
         <p:spPr>
           <a:xfrm>
-            <a:off x="7345680" y="0"/>
-            <a:ext cx="4846320" cy="6857990"/>
+            <a:off x="7833360" y="0"/>
+            <a:ext cx="4358640" cy="6167878"/>
           </a:xfrm>
           <a:prstGeom prst="rect">
             <a:avLst/>
@@ -6500,12 +7380,37 @@
           </a:p>
         </p:txBody>
       </p:sp>
+      <p:sp>
+        <p:nvSpPr>
+          <p:cNvPr id="6" name="Tijdelijke aanduiding voor voettekst 5">
+            <a:extLst>
+              <a:ext uri="{FF2B5EF4-FFF2-40B4-BE49-F238E27FC236}">
+                <a16:creationId xmlns:a16="http://schemas.microsoft.com/office/drawing/2014/main" id="{C35E06CD-E1D7-720A-5DCD-81157CCE0C0E}"/>
+              </a:ext>
+            </a:extLst>
+          </p:cNvPr>
+          <p:cNvSpPr>
+            <a:spLocks noGrp="1"/>
+          </p:cNvSpPr>
+          <p:nvPr>
+            <p:ph type="ftr" sz="quarter" idx="11"/>
+          </p:nvPr>
+        </p:nvSpPr>
+        <p:spPr/>
+        <p:txBody>
+          <a:bodyPr/>
+          <a:lstStyle/>
+          <a:p>
+            <a:endParaRPr lang="en-US" dirty="0"/>
+          </a:p>
+        </p:txBody>
+      </p:sp>
       <p:pic>
         <p:nvPicPr>
-          <p:cNvPr id="4" name="Picture 4" descr="101010 gegevens lijnen naar oneindig">
-            <a:extLst>
-              <a:ext uri="{FF2B5EF4-FFF2-40B4-BE49-F238E27FC236}">
-                <a16:creationId xmlns:a16="http://schemas.microsoft.com/office/drawing/2014/main" id="{084EB86E-EFF3-5EEB-4F3E-6603B106ED05}"/>
+          <p:cNvPr id="7" name="Picture 4" descr="101010 gegevens lijnen naar oneindig">
+            <a:extLst>
+              <a:ext uri="{FF2B5EF4-FFF2-40B4-BE49-F238E27FC236}">
+                <a16:creationId xmlns:a16="http://schemas.microsoft.com/office/drawing/2014/main" id="{DF87655D-3940-0B00-318D-8830D8BF9A8F}"/>
               </a:ext>
             </a:extLst>
           </p:cNvPr>
@@ -6527,8 +7432,8 @@
         </p:blipFill>
         <p:spPr>
           <a:xfrm>
-            <a:off x="7345680" y="10"/>
-            <a:ext cx="4846320" cy="6857990"/>
+            <a:off x="7833360" y="0"/>
+            <a:ext cx="4358640" cy="6167878"/>
           </a:xfrm>
           <a:prstGeom prst="rect">
             <a:avLst/>
@@ -6812,10 +7717,10 @@
       </p:sp>
       <p:pic>
         <p:nvPicPr>
-          <p:cNvPr id="4" name="Picture 4" descr="101010 gegevens lijnen naar oneindig">
-            <a:extLst>
-              <a:ext uri="{FF2B5EF4-FFF2-40B4-BE49-F238E27FC236}">
-                <a16:creationId xmlns:a16="http://schemas.microsoft.com/office/drawing/2014/main" id="{9E06EC2F-4C30-0CFF-FE90-CC33150AD463}"/>
+          <p:cNvPr id="5" name="Picture 4" descr="101010 gegevens lijnen naar oneindig">
+            <a:extLst>
+              <a:ext uri="{FF2B5EF4-FFF2-40B4-BE49-F238E27FC236}">
+                <a16:creationId xmlns:a16="http://schemas.microsoft.com/office/drawing/2014/main" id="{6E1A6A15-B597-AD7A-B173-49DB80898F9C}"/>
               </a:ext>
             </a:extLst>
           </p:cNvPr>
@@ -6837,14 +7742,39 @@
         </p:blipFill>
         <p:spPr>
           <a:xfrm>
-            <a:off x="7345680" y="10"/>
-            <a:ext cx="4846320" cy="6857990"/>
+            <a:off x="7833360" y="0"/>
+            <a:ext cx="4358640" cy="6167878"/>
           </a:xfrm>
           <a:prstGeom prst="rect">
             <a:avLst/>
           </a:prstGeom>
         </p:spPr>
       </p:pic>
+      <p:sp>
+        <p:nvSpPr>
+          <p:cNvPr id="6" name="Tijdelijke aanduiding voor voettekst 5">
+            <a:extLst>
+              <a:ext uri="{FF2B5EF4-FFF2-40B4-BE49-F238E27FC236}">
+                <a16:creationId xmlns:a16="http://schemas.microsoft.com/office/drawing/2014/main" id="{00FF91AE-DA30-687D-DD70-BAC640064AEF}"/>
+              </a:ext>
+            </a:extLst>
+          </p:cNvPr>
+          <p:cNvSpPr>
+            <a:spLocks noGrp="1"/>
+          </p:cNvSpPr>
+          <p:nvPr>
+            <p:ph type="ftr" sz="quarter" idx="11"/>
+          </p:nvPr>
+        </p:nvSpPr>
+        <p:spPr/>
+        <p:txBody>
+          <a:bodyPr/>
+          <a:lstStyle/>
+          <a:p>
+            <a:endParaRPr lang="en-US" dirty="0"/>
+          </a:p>
+        </p:txBody>
+      </p:sp>
     </p:spTree>
     <p:extLst>
       <p:ext uri="{BB962C8B-B14F-4D97-AF65-F5344CB8AC3E}">
@@ -7131,7 +8061,7 @@
           <p:nvPr/>
         </p:nvPicPr>
         <p:blipFill>
-          <a:blip r:embed="rId2">
+          <a:blip r:embed="rId3">
             <a:extLst>
               <a:ext uri="{28A0092B-C50C-407E-A947-70E740481C1C}">
                 <a14:useLocalDpi xmlns:a14="http://schemas.microsoft.com/office/drawing/2010/main" val="0"/>
@@ -7143,14 +8073,47 @@
         </p:blipFill>
         <p:spPr>
           <a:xfrm>
-            <a:off x="7345680" y="10"/>
-            <a:ext cx="4846320" cy="6857990"/>
+            <a:off x="7833360" y="0"/>
+            <a:ext cx="4358640" cy="6167878"/>
           </a:xfrm>
           <a:prstGeom prst="rect">
             <a:avLst/>
           </a:prstGeom>
         </p:spPr>
       </p:pic>
+      <p:sp>
+        <p:nvSpPr>
+          <p:cNvPr id="6" name="Tijdelijke aanduiding voor voettekst 5">
+            <a:extLst>
+              <a:ext uri="{FF2B5EF4-FFF2-40B4-BE49-F238E27FC236}">
+                <a16:creationId xmlns:a16="http://schemas.microsoft.com/office/drawing/2014/main" id="{D5323E10-68E2-5F24-3324-9FB6DCF5BFBA}"/>
+              </a:ext>
+            </a:extLst>
+          </p:cNvPr>
+          <p:cNvSpPr>
+            <a:spLocks noGrp="1"/>
+          </p:cNvSpPr>
+          <p:nvPr>
+            <p:ph type="ftr" sz="quarter" idx="11"/>
+          </p:nvPr>
+        </p:nvSpPr>
+        <p:spPr/>
+        <p:txBody>
+          <a:bodyPr/>
+          <a:lstStyle/>
+          <a:p>
+            <a:r>
+              <a:rPr lang="nl-NL" dirty="0" err="1"/>
+              <a:t>Baeldung</a:t>
+            </a:r>
+            <a:r>
+              <a:rPr lang="nl-NL" dirty="0"/>
+              <a:t> (2023)</a:t>
+            </a:r>
+            <a:endParaRPr lang="en-US" dirty="0"/>
+          </a:p>
+        </p:txBody>
+      </p:sp>
     </p:spTree>
     <p:extLst>
       <p:ext uri="{BB962C8B-B14F-4D97-AF65-F5344CB8AC3E}">
@@ -7401,12 +8364,58 @@
           </a:p>
         </p:txBody>
       </p:sp>
+      <p:sp>
+        <p:nvSpPr>
+          <p:cNvPr id="5" name="Tijdelijke aanduiding voor voettekst 4">
+            <a:extLst>
+              <a:ext uri="{FF2B5EF4-FFF2-40B4-BE49-F238E27FC236}">
+                <a16:creationId xmlns:a16="http://schemas.microsoft.com/office/drawing/2014/main" id="{ECC72AA6-4B5F-8376-1CDA-4E4FEB88A911}"/>
+              </a:ext>
+            </a:extLst>
+          </p:cNvPr>
+          <p:cNvSpPr>
+            <a:spLocks noGrp="1"/>
+          </p:cNvSpPr>
+          <p:nvPr>
+            <p:ph type="ftr" sz="quarter" idx="11"/>
+          </p:nvPr>
+        </p:nvSpPr>
+        <p:spPr>
+          <a:xfrm>
+            <a:off x="6767622" y="6356350"/>
+            <a:ext cx="5119578" cy="365125"/>
+          </a:xfrm>
+        </p:spPr>
+        <p:txBody>
+          <a:bodyPr/>
+          <a:lstStyle/>
+          <a:p>
+            <a:r>
+              <a:rPr lang="de-DE" dirty="0" err="1"/>
+              <a:t>Baeldung</a:t>
+            </a:r>
+            <a:r>
+              <a:rPr lang="de-DE" dirty="0"/>
+              <a:t> (2023); </a:t>
+            </a:r>
+            <a:r>
+              <a:rPr lang="de-DE" dirty="0" err="1"/>
+              <a:t>Paraschiv</a:t>
+            </a:r>
+            <a:r>
+              <a:rPr lang="de-DE" dirty="0"/>
+              <a:t> (2024); Oracle (2025)</a:t>
+            </a:r>
+            <a:endParaRPr lang="en-US" dirty="0"/>
+          </a:p>
+        </p:txBody>
+      </p:sp>
       <p:pic>
         <p:nvPicPr>
-          <p:cNvPr id="4" name="Picture 4" descr="101010 gegevens lijnen naar oneindig">
-            <a:extLst>
-              <a:ext uri="{FF2B5EF4-FFF2-40B4-BE49-F238E27FC236}">
-                <a16:creationId xmlns:a16="http://schemas.microsoft.com/office/drawing/2014/main" id="{799BAF5E-9DFB-0863-02FC-7FDB5528840E}"/>
+          <p:cNvPr id="6" name="Picture 4" descr="101010 gegevens lijnen naar oneindig">
+            <a:extLst>
+              <a:ext uri="{FF2B5EF4-FFF2-40B4-BE49-F238E27FC236}">
+                <a16:creationId xmlns:a16="http://schemas.microsoft.com/office/drawing/2014/main" id="{8FF9CE6A-0144-5DD2-FFC0-067966B22326}"/>
               </a:ext>
             </a:extLst>
           </p:cNvPr>
@@ -7428,8 +8437,8 @@
         </p:blipFill>
         <p:spPr>
           <a:xfrm>
-            <a:off x="7345680" y="10"/>
-            <a:ext cx="4846320" cy="6857990"/>
+            <a:off x="7833360" y="0"/>
+            <a:ext cx="4358640" cy="6167878"/>
           </a:xfrm>
           <a:prstGeom prst="rect">
             <a:avLst/>
@@ -7702,12 +8711,45 @@
           </a:p>
         </p:txBody>
       </p:sp>
+      <p:sp>
+        <p:nvSpPr>
+          <p:cNvPr id="6" name="Tijdelijke aanduiding voor voettekst 5">
+            <a:extLst>
+              <a:ext uri="{FF2B5EF4-FFF2-40B4-BE49-F238E27FC236}">
+                <a16:creationId xmlns:a16="http://schemas.microsoft.com/office/drawing/2014/main" id="{A12D46F6-1AD3-A173-35D7-F15BC187D427}"/>
+              </a:ext>
+            </a:extLst>
+          </p:cNvPr>
+          <p:cNvSpPr>
+            <a:spLocks noGrp="1"/>
+          </p:cNvSpPr>
+          <p:nvPr>
+            <p:ph type="ftr" sz="quarter" idx="11"/>
+          </p:nvPr>
+        </p:nvSpPr>
+        <p:spPr/>
+        <p:txBody>
+          <a:bodyPr/>
+          <a:lstStyle/>
+          <a:p>
+            <a:r>
+              <a:rPr lang="nl-NL" dirty="0" err="1"/>
+              <a:t>Baeldung</a:t>
+            </a:r>
+            <a:r>
+              <a:rPr lang="nl-NL" dirty="0"/>
+              <a:t> (2023); Oracle (2025); </a:t>
+            </a:r>
+            <a:endParaRPr lang="en-US" dirty="0"/>
+          </a:p>
+        </p:txBody>
+      </p:sp>
       <p:pic>
         <p:nvPicPr>
-          <p:cNvPr id="4" name="Picture 4" descr="101010 gegevens lijnen naar oneindig">
-            <a:extLst>
-              <a:ext uri="{FF2B5EF4-FFF2-40B4-BE49-F238E27FC236}">
-                <a16:creationId xmlns:a16="http://schemas.microsoft.com/office/drawing/2014/main" id="{B32542CC-AEB3-0591-410F-1D767D2CD43F}"/>
+          <p:cNvPr id="7" name="Picture 4" descr="101010 gegevens lijnen naar oneindig">
+            <a:extLst>
+              <a:ext uri="{FF2B5EF4-FFF2-40B4-BE49-F238E27FC236}">
+                <a16:creationId xmlns:a16="http://schemas.microsoft.com/office/drawing/2014/main" id="{02710C03-FC32-FEE9-E04D-FCFE52880204}"/>
               </a:ext>
             </a:extLst>
           </p:cNvPr>
@@ -7729,8 +8771,8 @@
         </p:blipFill>
         <p:spPr>
           <a:xfrm>
-            <a:off x="7345680" y="10"/>
-            <a:ext cx="4846320" cy="6857990"/>
+            <a:off x="7833360" y="0"/>
+            <a:ext cx="4358640" cy="6167878"/>
           </a:xfrm>
           <a:prstGeom prst="rect">
             <a:avLst/>
@@ -7997,12 +9039,45 @@
           </a:p>
         </p:txBody>
       </p:sp>
+      <p:sp>
+        <p:nvSpPr>
+          <p:cNvPr id="5" name="Tijdelijke aanduiding voor voettekst 4">
+            <a:extLst>
+              <a:ext uri="{FF2B5EF4-FFF2-40B4-BE49-F238E27FC236}">
+                <a16:creationId xmlns:a16="http://schemas.microsoft.com/office/drawing/2014/main" id="{A179D0D6-1DB7-F5EC-E394-126B4AEB023F}"/>
+              </a:ext>
+            </a:extLst>
+          </p:cNvPr>
+          <p:cNvSpPr>
+            <a:spLocks noGrp="1"/>
+          </p:cNvSpPr>
+          <p:nvPr>
+            <p:ph type="ftr" sz="quarter" idx="11"/>
+          </p:nvPr>
+        </p:nvSpPr>
+        <p:spPr/>
+        <p:txBody>
+          <a:bodyPr/>
+          <a:lstStyle/>
+          <a:p>
+            <a:r>
+              <a:rPr lang="nl-NL" dirty="0" err="1"/>
+              <a:t>Baeldung</a:t>
+            </a:r>
+            <a:r>
+              <a:rPr lang="nl-NL" dirty="0"/>
+              <a:t> (2023); Oracle (2025)</a:t>
+            </a:r>
+            <a:endParaRPr lang="en-US" dirty="0"/>
+          </a:p>
+        </p:txBody>
+      </p:sp>
       <p:pic>
         <p:nvPicPr>
-          <p:cNvPr id="4" name="Picture 4" descr="101010 gegevens lijnen naar oneindig">
-            <a:extLst>
-              <a:ext uri="{FF2B5EF4-FFF2-40B4-BE49-F238E27FC236}">
-                <a16:creationId xmlns:a16="http://schemas.microsoft.com/office/drawing/2014/main" id="{4B4A9D81-99E0-B6D0-A5BA-BCFEB31E800C}"/>
+          <p:cNvPr id="6" name="Picture 4" descr="101010 gegevens lijnen naar oneindig">
+            <a:extLst>
+              <a:ext uri="{FF2B5EF4-FFF2-40B4-BE49-F238E27FC236}">
+                <a16:creationId xmlns:a16="http://schemas.microsoft.com/office/drawing/2014/main" id="{B77FBE87-ED18-9F8C-7858-EF44F65698BC}"/>
               </a:ext>
             </a:extLst>
           </p:cNvPr>
@@ -8024,8 +9099,8 @@
         </p:blipFill>
         <p:spPr>
           <a:xfrm>
-            <a:off x="7345680" y="10"/>
-            <a:ext cx="4846320" cy="6857990"/>
+            <a:off x="7833360" y="0"/>
+            <a:ext cx="4358640" cy="6167878"/>
           </a:xfrm>
           <a:prstGeom prst="rect">
             <a:avLst/>
@@ -8244,4 +9319,634 @@
     </a:ext>
   </a:extLst>
 </a:theme>
+</file>
+
+<file path=ppt/theme/theme2.xml><?xml version="1.0" encoding="utf-8"?>
+<a:theme xmlns:a="http://schemas.openxmlformats.org/drawingml/2006/main" name="Kantoorthema">
+  <a:themeElements>
+    <a:clrScheme name="Office">
+      <a:dk1>
+        <a:sysClr val="windowText" lastClr="000000"/>
+      </a:dk1>
+      <a:lt1>
+        <a:sysClr val="window" lastClr="FFFFFF"/>
+      </a:lt1>
+      <a:dk2>
+        <a:srgbClr val="0E2841"/>
+      </a:dk2>
+      <a:lt2>
+        <a:srgbClr val="E8E8E8"/>
+      </a:lt2>
+      <a:accent1>
+        <a:srgbClr val="156082"/>
+      </a:accent1>
+      <a:accent2>
+        <a:srgbClr val="E97132"/>
+      </a:accent2>
+      <a:accent3>
+        <a:srgbClr val="196B24"/>
+      </a:accent3>
+      <a:accent4>
+        <a:srgbClr val="0F9ED5"/>
+      </a:accent4>
+      <a:accent5>
+        <a:srgbClr val="A02B93"/>
+      </a:accent5>
+      <a:accent6>
+        <a:srgbClr val="4EA72E"/>
+      </a:accent6>
+      <a:hlink>
+        <a:srgbClr val="467886"/>
+      </a:hlink>
+      <a:folHlink>
+        <a:srgbClr val="96607D"/>
+      </a:folHlink>
+    </a:clrScheme>
+    <a:fontScheme name="Office">
+      <a:majorFont>
+        <a:latin typeface="Aptos Display" panose="02110004020202020204"/>
+        <a:ea typeface=""/>
+        <a:cs typeface=""/>
+        <a:font script="Jpan" typeface="游ゴシック Light"/>
+        <a:font script="Hang" typeface="맑은 고딕"/>
+        <a:font script="Hans" typeface="等线 Light"/>
+        <a:font script="Hant" typeface="新細明體"/>
+        <a:font script="Arab" typeface="Times New Roman"/>
+        <a:font script="Hebr" typeface="Times New Roman"/>
+        <a:font script="Thai" typeface="Angsana New"/>
+        <a:font script="Ethi" typeface="Nyala"/>
+        <a:font script="Beng" typeface="Vrinda"/>
+        <a:font script="Gujr" typeface="Shruti"/>
+        <a:font script="Khmr" typeface="MoolBoran"/>
+        <a:font script="Knda" typeface="Tunga"/>
+        <a:font script="Guru" typeface="Raavi"/>
+        <a:font script="Cans" typeface="Euphemia"/>
+        <a:font script="Cher" typeface="Plantagenet Cherokee"/>
+        <a:font script="Yiii" typeface="Microsoft Yi Baiti"/>
+        <a:font script="Tibt" typeface="Microsoft Himalaya"/>
+        <a:font script="Thaa" typeface="MV Boli"/>
+        <a:font script="Deva" typeface="Mangal"/>
+        <a:font script="Telu" typeface="Gautami"/>
+        <a:font script="Taml" typeface="Latha"/>
+        <a:font script="Syrc" typeface="Estrangelo Edessa"/>
+        <a:font script="Orya" typeface="Kalinga"/>
+        <a:font script="Mlym" typeface="Kartika"/>
+        <a:font script="Laoo" typeface="DokChampa"/>
+        <a:font script="Sinh" typeface="Iskoola Pota"/>
+        <a:font script="Mong" typeface="Mongolian Baiti"/>
+        <a:font script="Viet" typeface="Times New Roman"/>
+        <a:font script="Uigh" typeface="Microsoft Uighur"/>
+        <a:font script="Geor" typeface="Sylfaen"/>
+        <a:font script="Armn" typeface="Arial"/>
+        <a:font script="Bugi" typeface="Leelawadee UI"/>
+        <a:font script="Bopo" typeface="Microsoft JhengHei"/>
+        <a:font script="Java" typeface="Javanese Text"/>
+        <a:font script="Lisu" typeface="Segoe UI"/>
+        <a:font script="Mymr" typeface="Myanmar Text"/>
+        <a:font script="Nkoo" typeface="Ebrima"/>
+        <a:font script="Olck" typeface="Nirmala UI"/>
+        <a:font script="Osma" typeface="Ebrima"/>
+        <a:font script="Phag" typeface="Phagspa"/>
+        <a:font script="Syrn" typeface="Estrangelo Edessa"/>
+        <a:font script="Syrj" typeface="Estrangelo Edessa"/>
+        <a:font script="Syre" typeface="Estrangelo Edessa"/>
+        <a:font script="Sora" typeface="Nirmala UI"/>
+        <a:font script="Tale" typeface="Microsoft Tai Le"/>
+        <a:font script="Talu" typeface="Microsoft New Tai Lue"/>
+        <a:font script="Tfng" typeface="Ebrima"/>
+      </a:majorFont>
+      <a:minorFont>
+        <a:latin typeface="Aptos" panose="02110004020202020204"/>
+        <a:ea typeface=""/>
+        <a:cs typeface=""/>
+        <a:font script="Jpan" typeface="游ゴシック"/>
+        <a:font script="Hang" typeface="맑은 고딕"/>
+        <a:font script="Hans" typeface="等线"/>
+        <a:font script="Hant" typeface="新細明體"/>
+        <a:font script="Arab" typeface="Arial"/>
+        <a:font script="Hebr" typeface="Arial"/>
+        <a:font script="Thai" typeface="Cordia New"/>
+        <a:font script="Ethi" typeface="Nyala"/>
+        <a:font script="Beng" typeface="Vrinda"/>
+        <a:font script="Gujr" typeface="Shruti"/>
+        <a:font script="Khmr" typeface="DaunPenh"/>
+        <a:font script="Knda" typeface="Tunga"/>
+        <a:font script="Guru" typeface="Raavi"/>
+        <a:font script="Cans" typeface="Euphemia"/>
+        <a:font script="Cher" typeface="Plantagenet Cherokee"/>
+        <a:font script="Yiii" typeface="Microsoft Yi Baiti"/>
+        <a:font script="Tibt" typeface="Microsoft Himalaya"/>
+        <a:font script="Thaa" typeface="MV Boli"/>
+        <a:font script="Deva" typeface="Mangal"/>
+        <a:font script="Telu" typeface="Gautami"/>
+        <a:font script="Taml" typeface="Latha"/>
+        <a:font script="Syrc" typeface="Estrangelo Edessa"/>
+        <a:font script="Orya" typeface="Kalinga"/>
+        <a:font script="Mlym" typeface="Kartika"/>
+        <a:font script="Laoo" typeface="DokChampa"/>
+        <a:font script="Sinh" typeface="Iskoola Pota"/>
+        <a:font script="Mong" typeface="Mongolian Baiti"/>
+        <a:font script="Viet" typeface="Arial"/>
+        <a:font script="Uigh" typeface="Microsoft Uighur"/>
+        <a:font script="Geor" typeface="Sylfaen"/>
+        <a:font script="Armn" typeface="Arial"/>
+        <a:font script="Bugi" typeface="Leelawadee UI"/>
+        <a:font script="Bopo" typeface="Microsoft JhengHei"/>
+        <a:font script="Java" typeface="Javanese Text"/>
+        <a:font script="Lisu" typeface="Segoe UI"/>
+        <a:font script="Mymr" typeface="Myanmar Text"/>
+        <a:font script="Nkoo" typeface="Ebrima"/>
+        <a:font script="Olck" typeface="Nirmala UI"/>
+        <a:font script="Osma" typeface="Ebrima"/>
+        <a:font script="Phag" typeface="Phagspa"/>
+        <a:font script="Syrn" typeface="Estrangelo Edessa"/>
+        <a:font script="Syrj" typeface="Estrangelo Edessa"/>
+        <a:font script="Syre" typeface="Estrangelo Edessa"/>
+        <a:font script="Sora" typeface="Nirmala UI"/>
+        <a:font script="Tale" typeface="Microsoft Tai Le"/>
+        <a:font script="Talu" typeface="Microsoft New Tai Lue"/>
+        <a:font script="Tfng" typeface="Ebrima"/>
+      </a:minorFont>
+    </a:fontScheme>
+    <a:fmtScheme name="Office">
+      <a:fillStyleLst>
+        <a:solidFill>
+          <a:schemeClr val="phClr"/>
+        </a:solidFill>
+        <a:gradFill rotWithShape="1">
+          <a:gsLst>
+            <a:gs pos="0">
+              <a:schemeClr val="phClr">
+                <a:lumMod val="110000"/>
+                <a:satMod val="105000"/>
+                <a:tint val="67000"/>
+              </a:schemeClr>
+            </a:gs>
+            <a:gs pos="50000">
+              <a:schemeClr val="phClr">
+                <a:lumMod val="105000"/>
+                <a:satMod val="103000"/>
+                <a:tint val="73000"/>
+              </a:schemeClr>
+            </a:gs>
+            <a:gs pos="100000">
+              <a:schemeClr val="phClr">
+                <a:lumMod val="105000"/>
+                <a:satMod val="109000"/>
+                <a:tint val="81000"/>
+              </a:schemeClr>
+            </a:gs>
+          </a:gsLst>
+          <a:lin ang="5400000" scaled="0"/>
+        </a:gradFill>
+        <a:gradFill rotWithShape="1">
+          <a:gsLst>
+            <a:gs pos="0">
+              <a:schemeClr val="phClr">
+                <a:satMod val="103000"/>
+                <a:lumMod val="102000"/>
+                <a:tint val="94000"/>
+              </a:schemeClr>
+            </a:gs>
+            <a:gs pos="50000">
+              <a:schemeClr val="phClr">
+                <a:satMod val="110000"/>
+                <a:lumMod val="100000"/>
+                <a:shade val="100000"/>
+              </a:schemeClr>
+            </a:gs>
+            <a:gs pos="100000">
+              <a:schemeClr val="phClr">
+                <a:lumMod val="99000"/>
+                <a:satMod val="120000"/>
+                <a:shade val="78000"/>
+              </a:schemeClr>
+            </a:gs>
+          </a:gsLst>
+          <a:lin ang="5400000" scaled="0"/>
+        </a:gradFill>
+      </a:fillStyleLst>
+      <a:lnStyleLst>
+        <a:ln w="12700" cap="flat" cmpd="sng" algn="ctr">
+          <a:solidFill>
+            <a:schemeClr val="phClr"/>
+          </a:solidFill>
+          <a:prstDash val="solid"/>
+          <a:miter lim="800000"/>
+        </a:ln>
+        <a:ln w="19050" cap="flat" cmpd="sng" algn="ctr">
+          <a:solidFill>
+            <a:schemeClr val="phClr"/>
+          </a:solidFill>
+          <a:prstDash val="solid"/>
+          <a:miter lim="800000"/>
+        </a:ln>
+        <a:ln w="25400" cap="flat" cmpd="sng" algn="ctr">
+          <a:solidFill>
+            <a:schemeClr val="phClr"/>
+          </a:solidFill>
+          <a:prstDash val="solid"/>
+          <a:miter lim="800000"/>
+        </a:ln>
+      </a:lnStyleLst>
+      <a:effectStyleLst>
+        <a:effectStyle>
+          <a:effectLst/>
+        </a:effectStyle>
+        <a:effectStyle>
+          <a:effectLst/>
+        </a:effectStyle>
+        <a:effectStyle>
+          <a:effectLst>
+            <a:outerShdw blurRad="57150" dist="19050" dir="5400000" algn="ctr" rotWithShape="0">
+              <a:srgbClr val="000000">
+                <a:alpha val="63000"/>
+              </a:srgbClr>
+            </a:outerShdw>
+          </a:effectLst>
+        </a:effectStyle>
+      </a:effectStyleLst>
+      <a:bgFillStyleLst>
+        <a:solidFill>
+          <a:schemeClr val="phClr"/>
+        </a:solidFill>
+        <a:solidFill>
+          <a:schemeClr val="phClr">
+            <a:tint val="95000"/>
+            <a:satMod val="170000"/>
+          </a:schemeClr>
+        </a:solidFill>
+        <a:gradFill rotWithShape="1">
+          <a:gsLst>
+            <a:gs pos="0">
+              <a:schemeClr val="phClr">
+                <a:tint val="93000"/>
+                <a:satMod val="150000"/>
+                <a:shade val="98000"/>
+                <a:lumMod val="102000"/>
+              </a:schemeClr>
+            </a:gs>
+            <a:gs pos="50000">
+              <a:schemeClr val="phClr">
+                <a:tint val="98000"/>
+                <a:satMod val="130000"/>
+                <a:shade val="90000"/>
+                <a:lumMod val="103000"/>
+              </a:schemeClr>
+            </a:gs>
+            <a:gs pos="100000">
+              <a:schemeClr val="phClr">
+                <a:shade val="63000"/>
+                <a:satMod val="120000"/>
+              </a:schemeClr>
+            </a:gs>
+          </a:gsLst>
+          <a:lin ang="5400000" scaled="0"/>
+        </a:gradFill>
+      </a:bgFillStyleLst>
+    </a:fmtScheme>
+  </a:themeElements>
+  <a:objectDefaults>
+    <a:lnDef>
+      <a:spPr/>
+      <a:bodyPr/>
+      <a:lstStyle/>
+      <a:style>
+        <a:lnRef idx="2">
+          <a:schemeClr val="accent1"/>
+        </a:lnRef>
+        <a:fillRef idx="0">
+          <a:schemeClr val="accent1"/>
+        </a:fillRef>
+        <a:effectRef idx="1">
+          <a:schemeClr val="accent1"/>
+        </a:effectRef>
+        <a:fontRef idx="minor">
+          <a:schemeClr val="tx1"/>
+        </a:fontRef>
+      </a:style>
+    </a:lnDef>
+  </a:objectDefaults>
+  <a:extraClrSchemeLst/>
+  <a:extLst>
+    <a:ext uri="{05A4C25C-085E-4340-85A3-A5531E510DB2}">
+      <thm15:themeFamily xmlns:thm15="http://schemas.microsoft.com/office/thememl/2012/main" name="Office Theme" id="{2E142A2C-CD16-42D6-873A-C26D2A0506FA}" vid="{1BDDFF52-6CD6-40A5-AB3C-68EB2F1E4D0A}"/>
+    </a:ext>
+  </a:extLst>
+</a:theme>
+</file>
+
+<file path=ppt/theme/theme3.xml><?xml version="1.0" encoding="utf-8"?>
+<a:theme xmlns:a="http://schemas.openxmlformats.org/drawingml/2006/main" name="Kantoorthema">
+  <a:themeElements>
+    <a:clrScheme name="Office">
+      <a:dk1>
+        <a:sysClr val="windowText" lastClr="000000"/>
+      </a:dk1>
+      <a:lt1>
+        <a:sysClr val="window" lastClr="FFFFFF"/>
+      </a:lt1>
+      <a:dk2>
+        <a:srgbClr val="0E2841"/>
+      </a:dk2>
+      <a:lt2>
+        <a:srgbClr val="E8E8E8"/>
+      </a:lt2>
+      <a:accent1>
+        <a:srgbClr val="156082"/>
+      </a:accent1>
+      <a:accent2>
+        <a:srgbClr val="E97132"/>
+      </a:accent2>
+      <a:accent3>
+        <a:srgbClr val="196B24"/>
+      </a:accent3>
+      <a:accent4>
+        <a:srgbClr val="0F9ED5"/>
+      </a:accent4>
+      <a:accent5>
+        <a:srgbClr val="A02B93"/>
+      </a:accent5>
+      <a:accent6>
+        <a:srgbClr val="4EA72E"/>
+      </a:accent6>
+      <a:hlink>
+        <a:srgbClr val="467886"/>
+      </a:hlink>
+      <a:folHlink>
+        <a:srgbClr val="96607D"/>
+      </a:folHlink>
+    </a:clrScheme>
+    <a:fontScheme name="Office">
+      <a:majorFont>
+        <a:latin typeface="Aptos Display" panose="02110004020202020204"/>
+        <a:ea typeface=""/>
+        <a:cs typeface=""/>
+        <a:font script="Jpan" typeface="游ゴシック Light"/>
+        <a:font script="Hang" typeface="맑은 고딕"/>
+        <a:font script="Hans" typeface="等线 Light"/>
+        <a:font script="Hant" typeface="新細明體"/>
+        <a:font script="Arab" typeface="Times New Roman"/>
+        <a:font script="Hebr" typeface="Times New Roman"/>
+        <a:font script="Thai" typeface="Angsana New"/>
+        <a:font script="Ethi" typeface="Nyala"/>
+        <a:font script="Beng" typeface="Vrinda"/>
+        <a:font script="Gujr" typeface="Shruti"/>
+        <a:font script="Khmr" typeface="MoolBoran"/>
+        <a:font script="Knda" typeface="Tunga"/>
+        <a:font script="Guru" typeface="Raavi"/>
+        <a:font script="Cans" typeface="Euphemia"/>
+        <a:font script="Cher" typeface="Plantagenet Cherokee"/>
+        <a:font script="Yiii" typeface="Microsoft Yi Baiti"/>
+        <a:font script="Tibt" typeface="Microsoft Himalaya"/>
+        <a:font script="Thaa" typeface="MV Boli"/>
+        <a:font script="Deva" typeface="Mangal"/>
+        <a:font script="Telu" typeface="Gautami"/>
+        <a:font script="Taml" typeface="Latha"/>
+        <a:font script="Syrc" typeface="Estrangelo Edessa"/>
+        <a:font script="Orya" typeface="Kalinga"/>
+        <a:font script="Mlym" typeface="Kartika"/>
+        <a:font script="Laoo" typeface="DokChampa"/>
+        <a:font script="Sinh" typeface="Iskoola Pota"/>
+        <a:font script="Mong" typeface="Mongolian Baiti"/>
+        <a:font script="Viet" typeface="Times New Roman"/>
+        <a:font script="Uigh" typeface="Microsoft Uighur"/>
+        <a:font script="Geor" typeface="Sylfaen"/>
+        <a:font script="Armn" typeface="Arial"/>
+        <a:font script="Bugi" typeface="Leelawadee UI"/>
+        <a:font script="Bopo" typeface="Microsoft JhengHei"/>
+        <a:font script="Java" typeface="Javanese Text"/>
+        <a:font script="Lisu" typeface="Segoe UI"/>
+        <a:font script="Mymr" typeface="Myanmar Text"/>
+        <a:font script="Nkoo" typeface="Ebrima"/>
+        <a:font script="Olck" typeface="Nirmala UI"/>
+        <a:font script="Osma" typeface="Ebrima"/>
+        <a:font script="Phag" typeface="Phagspa"/>
+        <a:font script="Syrn" typeface="Estrangelo Edessa"/>
+        <a:font script="Syrj" typeface="Estrangelo Edessa"/>
+        <a:font script="Syre" typeface="Estrangelo Edessa"/>
+        <a:font script="Sora" typeface="Nirmala UI"/>
+        <a:font script="Tale" typeface="Microsoft Tai Le"/>
+        <a:font script="Talu" typeface="Microsoft New Tai Lue"/>
+        <a:font script="Tfng" typeface="Ebrima"/>
+      </a:majorFont>
+      <a:minorFont>
+        <a:latin typeface="Aptos" panose="02110004020202020204"/>
+        <a:ea typeface=""/>
+        <a:cs typeface=""/>
+        <a:font script="Jpan" typeface="游ゴシック"/>
+        <a:font script="Hang" typeface="맑은 고딕"/>
+        <a:font script="Hans" typeface="等线"/>
+        <a:font script="Hant" typeface="新細明體"/>
+        <a:font script="Arab" typeface="Arial"/>
+        <a:font script="Hebr" typeface="Arial"/>
+        <a:font script="Thai" typeface="Cordia New"/>
+        <a:font script="Ethi" typeface="Nyala"/>
+        <a:font script="Beng" typeface="Vrinda"/>
+        <a:font script="Gujr" typeface="Shruti"/>
+        <a:font script="Khmr" typeface="DaunPenh"/>
+        <a:font script="Knda" typeface="Tunga"/>
+        <a:font script="Guru" typeface="Raavi"/>
+        <a:font script="Cans" typeface="Euphemia"/>
+        <a:font script="Cher" typeface="Plantagenet Cherokee"/>
+        <a:font script="Yiii" typeface="Microsoft Yi Baiti"/>
+        <a:font script="Tibt" typeface="Microsoft Himalaya"/>
+        <a:font script="Thaa" typeface="MV Boli"/>
+        <a:font script="Deva" typeface="Mangal"/>
+        <a:font script="Telu" typeface="Gautami"/>
+        <a:font script="Taml" typeface="Latha"/>
+        <a:font script="Syrc" typeface="Estrangelo Edessa"/>
+        <a:font script="Orya" typeface="Kalinga"/>
+        <a:font script="Mlym" typeface="Kartika"/>
+        <a:font script="Laoo" typeface="DokChampa"/>
+        <a:font script="Sinh" typeface="Iskoola Pota"/>
+        <a:font script="Mong" typeface="Mongolian Baiti"/>
+        <a:font script="Viet" typeface="Arial"/>
+        <a:font script="Uigh" typeface="Microsoft Uighur"/>
+        <a:font script="Geor" typeface="Sylfaen"/>
+        <a:font script="Armn" typeface="Arial"/>
+        <a:font script="Bugi" typeface="Leelawadee UI"/>
+        <a:font script="Bopo" typeface="Microsoft JhengHei"/>
+        <a:font script="Java" typeface="Javanese Text"/>
+        <a:font script="Lisu" typeface="Segoe UI"/>
+        <a:font script="Mymr" typeface="Myanmar Text"/>
+        <a:font script="Nkoo" typeface="Ebrima"/>
+        <a:font script="Olck" typeface="Nirmala UI"/>
+        <a:font script="Osma" typeface="Ebrima"/>
+        <a:font script="Phag" typeface="Phagspa"/>
+        <a:font script="Syrn" typeface="Estrangelo Edessa"/>
+        <a:font script="Syrj" typeface="Estrangelo Edessa"/>
+        <a:font script="Syre" typeface="Estrangelo Edessa"/>
+        <a:font script="Sora" typeface="Nirmala UI"/>
+        <a:font script="Tale" typeface="Microsoft Tai Le"/>
+        <a:font script="Talu" typeface="Microsoft New Tai Lue"/>
+        <a:font script="Tfng" typeface="Ebrima"/>
+      </a:minorFont>
+    </a:fontScheme>
+    <a:fmtScheme name="Office">
+      <a:fillStyleLst>
+        <a:solidFill>
+          <a:schemeClr val="phClr"/>
+        </a:solidFill>
+        <a:gradFill rotWithShape="1">
+          <a:gsLst>
+            <a:gs pos="0">
+              <a:schemeClr val="phClr">
+                <a:lumMod val="110000"/>
+                <a:satMod val="105000"/>
+                <a:tint val="67000"/>
+              </a:schemeClr>
+            </a:gs>
+            <a:gs pos="50000">
+              <a:schemeClr val="phClr">
+                <a:lumMod val="105000"/>
+                <a:satMod val="103000"/>
+                <a:tint val="73000"/>
+              </a:schemeClr>
+            </a:gs>
+            <a:gs pos="100000">
+              <a:schemeClr val="phClr">
+                <a:lumMod val="105000"/>
+                <a:satMod val="109000"/>
+                <a:tint val="81000"/>
+              </a:schemeClr>
+            </a:gs>
+          </a:gsLst>
+          <a:lin ang="5400000" scaled="0"/>
+        </a:gradFill>
+        <a:gradFill rotWithShape="1">
+          <a:gsLst>
+            <a:gs pos="0">
+              <a:schemeClr val="phClr">
+                <a:satMod val="103000"/>
+                <a:lumMod val="102000"/>
+                <a:tint val="94000"/>
+              </a:schemeClr>
+            </a:gs>
+            <a:gs pos="50000">
+              <a:schemeClr val="phClr">
+                <a:satMod val="110000"/>
+                <a:lumMod val="100000"/>
+                <a:shade val="100000"/>
+              </a:schemeClr>
+            </a:gs>
+            <a:gs pos="100000">
+              <a:schemeClr val="phClr">
+                <a:lumMod val="99000"/>
+                <a:satMod val="120000"/>
+                <a:shade val="78000"/>
+              </a:schemeClr>
+            </a:gs>
+          </a:gsLst>
+          <a:lin ang="5400000" scaled="0"/>
+        </a:gradFill>
+      </a:fillStyleLst>
+      <a:lnStyleLst>
+        <a:ln w="12700" cap="flat" cmpd="sng" algn="ctr">
+          <a:solidFill>
+            <a:schemeClr val="phClr"/>
+          </a:solidFill>
+          <a:prstDash val="solid"/>
+          <a:miter lim="800000"/>
+        </a:ln>
+        <a:ln w="19050" cap="flat" cmpd="sng" algn="ctr">
+          <a:solidFill>
+            <a:schemeClr val="phClr"/>
+          </a:solidFill>
+          <a:prstDash val="solid"/>
+          <a:miter lim="800000"/>
+        </a:ln>
+        <a:ln w="25400" cap="flat" cmpd="sng" algn="ctr">
+          <a:solidFill>
+            <a:schemeClr val="phClr"/>
+          </a:solidFill>
+          <a:prstDash val="solid"/>
+          <a:miter lim="800000"/>
+        </a:ln>
+      </a:lnStyleLst>
+      <a:effectStyleLst>
+        <a:effectStyle>
+          <a:effectLst/>
+        </a:effectStyle>
+        <a:effectStyle>
+          <a:effectLst/>
+        </a:effectStyle>
+        <a:effectStyle>
+          <a:effectLst>
+            <a:outerShdw blurRad="57150" dist="19050" dir="5400000" algn="ctr" rotWithShape="0">
+              <a:srgbClr val="000000">
+                <a:alpha val="63000"/>
+              </a:srgbClr>
+            </a:outerShdw>
+          </a:effectLst>
+        </a:effectStyle>
+      </a:effectStyleLst>
+      <a:bgFillStyleLst>
+        <a:solidFill>
+          <a:schemeClr val="phClr"/>
+        </a:solidFill>
+        <a:solidFill>
+          <a:schemeClr val="phClr">
+            <a:tint val="95000"/>
+            <a:satMod val="170000"/>
+          </a:schemeClr>
+        </a:solidFill>
+        <a:gradFill rotWithShape="1">
+          <a:gsLst>
+            <a:gs pos="0">
+              <a:schemeClr val="phClr">
+                <a:tint val="93000"/>
+                <a:satMod val="150000"/>
+                <a:shade val="98000"/>
+                <a:lumMod val="102000"/>
+              </a:schemeClr>
+            </a:gs>
+            <a:gs pos="50000">
+              <a:schemeClr val="phClr">
+                <a:tint val="98000"/>
+                <a:satMod val="130000"/>
+                <a:shade val="90000"/>
+                <a:lumMod val="103000"/>
+              </a:schemeClr>
+            </a:gs>
+            <a:gs pos="100000">
+              <a:schemeClr val="phClr">
+                <a:shade val="63000"/>
+                <a:satMod val="120000"/>
+              </a:schemeClr>
+            </a:gs>
+          </a:gsLst>
+          <a:lin ang="5400000" scaled="0"/>
+        </a:gradFill>
+      </a:bgFillStyleLst>
+    </a:fmtScheme>
+  </a:themeElements>
+  <a:objectDefaults>
+    <a:lnDef>
+      <a:spPr/>
+      <a:bodyPr/>
+      <a:lstStyle/>
+      <a:style>
+        <a:lnRef idx="2">
+          <a:schemeClr val="accent1"/>
+        </a:lnRef>
+        <a:fillRef idx="0">
+          <a:schemeClr val="accent1"/>
+        </a:fillRef>
+        <a:effectRef idx="1">
+          <a:schemeClr val="accent1"/>
+        </a:effectRef>
+        <a:fontRef idx="minor">
+          <a:schemeClr val="tx1"/>
+        </a:fontRef>
+      </a:style>
+    </a:lnDef>
+  </a:objectDefaults>
+  <a:extraClrSchemeLst/>
+  <a:extLst>
+    <a:ext uri="{05A4C25C-085E-4340-85A3-A5531E510DB2}">
+      <thm15:themeFamily xmlns:thm15="http://schemas.microsoft.com/office/thememl/2012/main" name="Office Theme" id="{2E142A2C-CD16-42D6-873A-C26D2A0506FA}" vid="{1BDDFF52-6CD6-40A5-AB3C-68EB2F1E4D0A}"/>
+    </a:ext>
+  </a:extLst>
+</a:theme>
 </file>
</xml_diff>